<commit_message>
added organ anotation example slide
</commit_message>
<xml_diff>
--- a/main.pptx
+++ b/main.pptx
@@ -5,15 +5,16 @@
     <p:sldMasterId id="2147483648" r:id="rId1"/>
   </p:sldMasterIdLst>
   <p:notesMasterIdLst>
-    <p:notesMasterId r:id="rId8"/>
+    <p:notesMasterId r:id="rId9"/>
   </p:notesMasterIdLst>
   <p:sldIdLst>
     <p:sldId id="256" r:id="rId2"/>
     <p:sldId id="257" r:id="rId3"/>
     <p:sldId id="258" r:id="rId4"/>
-    <p:sldId id="277" r:id="rId5"/>
-    <p:sldId id="264" r:id="rId6"/>
-    <p:sldId id="274" r:id="rId7"/>
+    <p:sldId id="275" r:id="rId5"/>
+    <p:sldId id="277" r:id="rId6"/>
+    <p:sldId id="264" r:id="rId7"/>
+    <p:sldId id="274" r:id="rId8"/>
   </p:sldIdLst>
   <p:sldSz cx="12192000" cy="6858000"/>
   <p:notesSz cx="6858000" cy="9144000"/>
@@ -948,6 +949,149 @@
     </p:spTree>
     <p:extLst>
       <p:ext uri="{BB962C8B-B14F-4D97-AF65-F5344CB8AC3E}">
+        <p14:creationId xmlns:p14="http://schemas.microsoft.com/office/powerpoint/2010/main" val="2702070802"/>
+      </p:ext>
+    </p:extLst>
+  </p:cSld>
+  <p:clrMapOvr>
+    <a:masterClrMapping/>
+  </p:clrMapOvr>
+</p:notes>
+</file>
+
+<file path=ppt/notesSlides/notesSlide4.xml><?xml version="1.0" encoding="utf-8"?>
+<p:notes xmlns:a="http://schemas.openxmlformats.org/drawingml/2006/main" xmlns:r="http://schemas.openxmlformats.org/officeDocument/2006/relationships" xmlns:p="http://schemas.openxmlformats.org/presentationml/2006/main" showMasterSp="0" showMasterPhAnim="0">
+  <p:cSld>
+    <p:spTree>
+      <p:nvGrpSpPr>
+        <p:cNvPr id="1" name="Shape 192"/>
+        <p:cNvGrpSpPr/>
+        <p:nvPr/>
+      </p:nvGrpSpPr>
+      <p:grpSpPr>
+        <a:xfrm>
+          <a:off x="0" y="0"/>
+          <a:ext cx="0" cy="0"/>
+          <a:chOff x="0" y="0"/>
+          <a:chExt cx="0" cy="0"/>
+        </a:xfrm>
+      </p:grpSpPr>
+      <p:sp>
+        <p:nvSpPr>
+          <p:cNvPr id="193" name="Google Shape;193;p3:notes"/>
+          <p:cNvSpPr>
+            <a:spLocks noGrp="1" noRot="1" noChangeAspect="1"/>
+          </p:cNvSpPr>
+          <p:nvPr>
+            <p:ph type="sldImg" idx="2"/>
+          </p:nvPr>
+        </p:nvSpPr>
+        <p:spPr>
+          <a:xfrm>
+            <a:off x="381000" y="685800"/>
+            <a:ext cx="6096000" cy="3429000"/>
+          </a:xfrm>
+          <a:custGeom>
+            <a:avLst/>
+            <a:gdLst/>
+            <a:ahLst/>
+            <a:cxnLst/>
+            <a:rect l="l" t="t" r="r" b="b"/>
+            <a:pathLst>
+              <a:path w="120000" h="120000" extrusionOk="0">
+                <a:moveTo>
+                  <a:pt x="0" y="0"/>
+                </a:moveTo>
+                <a:lnTo>
+                  <a:pt x="120000" y="0"/>
+                </a:lnTo>
+                <a:lnTo>
+                  <a:pt x="120000" y="120000"/>
+                </a:lnTo>
+                <a:lnTo>
+                  <a:pt x="0" y="120000"/>
+                </a:lnTo>
+                <a:close/>
+              </a:path>
+            </a:pathLst>
+          </a:custGeom>
+          <a:noFill/>
+          <a:ln w="12700" cap="flat" cmpd="sng">
+            <a:solidFill>
+              <a:srgbClr val="000000"/>
+            </a:solidFill>
+            <a:prstDash val="solid"/>
+            <a:round/>
+            <a:headEnd type="none" w="sm" len="sm"/>
+            <a:tailEnd type="none" w="sm" len="sm"/>
+          </a:ln>
+        </p:spPr>
+      </p:sp>
+      <p:sp>
+        <p:nvSpPr>
+          <p:cNvPr id="194" name="Google Shape;194;p3:notes"/>
+          <p:cNvSpPr txBox="1">
+            <a:spLocks noGrp="1"/>
+          </p:cNvSpPr>
+          <p:nvPr>
+            <p:ph type="body" idx="1"/>
+          </p:nvPr>
+        </p:nvSpPr>
+        <p:spPr>
+          <a:xfrm>
+            <a:off x="685800" y="4343400"/>
+            <a:ext cx="5486400" cy="4114800"/>
+          </a:xfrm>
+          <a:prstGeom prst="rect">
+            <a:avLst/>
+          </a:prstGeom>
+          <a:noFill/>
+          <a:ln>
+            <a:noFill/>
+          </a:ln>
+        </p:spPr>
+        <p:txBody>
+          <a:bodyPr spcFirstLastPara="1" wrap="square" lIns="91425" tIns="91425" rIns="91425" bIns="91425" anchor="t" anchorCtr="0">
+            <a:noAutofit/>
+          </a:bodyPr>
+          <a:lstStyle/>
+          <a:p>
+            <a:pPr marL="0" lvl="0" indent="0" algn="l" rtl="0">
+              <a:lnSpc>
+                <a:spcPct val="115000"/>
+              </a:lnSpc>
+              <a:spcBef>
+                <a:spcPts val="1200"/>
+              </a:spcBef>
+              <a:spcAft>
+                <a:spcPts val="1200"/>
+              </a:spcAft>
+              <a:buClr>
+                <a:schemeClr val="dk1"/>
+              </a:buClr>
+              <a:buSzPts val="1100"/>
+              <a:buFont typeface="Arial"/>
+              <a:buNone/>
+            </a:pPr>
+            <a:r>
+              <a:rPr lang="fr-FR" sz="1800">
+                <a:solidFill>
+                  <a:srgbClr val="0000FF"/>
+                </a:solidFill>
+                <a:latin typeface="Arial"/>
+                <a:ea typeface="Arial"/>
+                <a:cs typeface="Arial"/>
+                <a:sym typeface="Arial"/>
+              </a:rPr>
+              <a:t>Annotate is our AI powered contouring tool, it has been in clinical use since 2019. We currently offer 150+ structures comprising OARS and Lymph nodes for both CT and over 70 structures for MR. Including our most recent release of CT substructures of the heart and SBRT Thorax. It takes up to 4 minutes for contours to be completed. Annotate is a robust solution that is completely plug and play. As soon as you have it installed you can take advantage of the expert contours without having to provide any training data.</a:t>
+            </a:r>
+            <a:endParaRPr sz="1800"/>
+          </a:p>
+        </p:txBody>
+      </p:sp>
+    </p:spTree>
+    <p:extLst>
+      <p:ext uri="{BB962C8B-B14F-4D97-AF65-F5344CB8AC3E}">
         <p14:creationId xmlns:p14="http://schemas.microsoft.com/office/powerpoint/2010/main" val="1808066577"/>
       </p:ext>
     </p:extLst>
@@ -958,7 +1102,7 @@
 </p:notes>
 </file>
 
-<file path=ppt/notesSlides/notesSlide4.xml><?xml version="1.0" encoding="utf-8"?>
+<file path=ppt/notesSlides/notesSlide5.xml><?xml version="1.0" encoding="utf-8"?>
 <p:notes xmlns:a="http://schemas.openxmlformats.org/drawingml/2006/main" xmlns:r="http://schemas.openxmlformats.org/officeDocument/2006/relationships" xmlns:p="http://schemas.openxmlformats.org/presentationml/2006/main" showMasterSp="0" showMasterPhAnim="0">
   <p:cSld>
     <p:spTree>
@@ -1136,7 +1280,7 @@
 </p:notes>
 </file>
 
-<file path=ppt/notesSlides/notesSlide5.xml><?xml version="1.0" encoding="utf-8"?>
+<file path=ppt/notesSlides/notesSlide6.xml><?xml version="1.0" encoding="utf-8"?>
 <p:notes xmlns:a="http://schemas.openxmlformats.org/drawingml/2006/main" xmlns:r="http://schemas.openxmlformats.org/officeDocument/2006/relationships" xmlns:p="http://schemas.openxmlformats.org/presentationml/2006/main" showMasterSp="0" showMasterPhAnim="0">
   <p:cSld>
     <p:spTree>
@@ -10868,6 +11012,194 @@
       </p:grpSpPr>
       <p:sp>
         <p:nvSpPr>
+          <p:cNvPr id="198" name="Google Shape;198;p3"/>
+          <p:cNvSpPr txBox="1"/>
+          <p:nvPr/>
+        </p:nvSpPr>
+        <p:spPr>
+          <a:xfrm>
+            <a:off x="1" y="377574"/>
+            <a:ext cx="12191999" cy="726732"/>
+          </a:xfrm>
+          <a:prstGeom prst="rect">
+            <a:avLst/>
+          </a:prstGeom>
+          <a:noFill/>
+          <a:ln>
+            <a:noFill/>
+          </a:ln>
+        </p:spPr>
+        <p:txBody>
+          <a:bodyPr spcFirstLastPara="1" wrap="square" lIns="121900" tIns="121900" rIns="121900" bIns="121900" anchor="t" anchorCtr="0">
+            <a:noAutofit/>
+          </a:bodyPr>
+          <a:lstStyle/>
+          <a:p>
+            <a:pPr marL="0" marR="0" lvl="0" indent="0" algn="ctr" rtl="0">
+              <a:lnSpc>
+                <a:spcPct val="100000"/>
+              </a:lnSpc>
+              <a:spcBef>
+                <a:spcPts val="0"/>
+              </a:spcBef>
+              <a:spcAft>
+                <a:spcPts val="0"/>
+              </a:spcAft>
+              <a:buClr>
+                <a:schemeClr val="dk2"/>
+              </a:buClr>
+              <a:buSzPts val="2400"/>
+              <a:buFont typeface="Exo 2"/>
+              <a:buNone/>
+            </a:pPr>
+            <a:r>
+              <a:rPr lang="fr-FR" sz="4267" b="1" i="0" u="none" strike="noStrike" cap="none" dirty="0">
+                <a:solidFill>
+                  <a:schemeClr val="lt2"/>
+                </a:solidFill>
+                <a:latin typeface="Exo 2"/>
+                <a:ea typeface="Exo 2"/>
+                <a:cs typeface="Exo 2"/>
+                <a:sym typeface="Exo 2"/>
+              </a:rPr>
+              <a:t>Annotation</a:t>
+            </a:r>
+            <a:endParaRPr sz="1400" b="0" i="0" u="none" strike="noStrike" cap="none" dirty="0">
+              <a:solidFill>
+                <a:srgbClr val="000000"/>
+              </a:solidFill>
+              <a:latin typeface="Arial"/>
+              <a:ea typeface="Arial"/>
+              <a:cs typeface="Arial"/>
+              <a:sym typeface="Arial"/>
+            </a:endParaRPr>
+          </a:p>
+        </p:txBody>
+      </p:sp>
+      <p:pic>
+        <p:nvPicPr>
+          <p:cNvPr id="202" name="Google Shape;202;p3"/>
+          <p:cNvPicPr preferRelativeResize="0"/>
+          <p:nvPr/>
+        </p:nvPicPr>
+        <p:blipFill rotWithShape="1">
+          <a:blip r:embed="rId3">
+            <a:alphaModFix/>
+          </a:blip>
+          <a:srcRect t="29380" b="29381"/>
+          <a:stretch/>
+        </p:blipFill>
+        <p:spPr>
+          <a:xfrm>
+            <a:off x="10182759" y="5979560"/>
+            <a:ext cx="1762198" cy="726732"/>
+          </a:xfrm>
+          <a:prstGeom prst="rect">
+            <a:avLst/>
+          </a:prstGeom>
+          <a:noFill/>
+          <a:ln>
+            <a:noFill/>
+          </a:ln>
+        </p:spPr>
+      </p:pic>
+      <p:pic>
+        <p:nvPicPr>
+          <p:cNvPr id="7" name="Picture 6">
+            <a:extLst>
+              <a:ext uri="{FF2B5EF4-FFF2-40B4-BE49-F238E27FC236}">
+                <a16:creationId xmlns:a16="http://schemas.microsoft.com/office/drawing/2014/main" id="{94056523-D195-EDB7-2D97-96D562B35D6F}"/>
+              </a:ext>
+            </a:extLst>
+          </p:cNvPr>
+          <p:cNvPicPr>
+            <a:picLocks noChangeAspect="1"/>
+          </p:cNvPicPr>
+          <p:nvPr/>
+        </p:nvPicPr>
+        <p:blipFill>
+          <a:blip r:embed="rId4"/>
+          <a:stretch>
+            <a:fillRect/>
+          </a:stretch>
+        </p:blipFill>
+        <p:spPr>
+          <a:xfrm>
+            <a:off x="1129677" y="1514475"/>
+            <a:ext cx="3271164" cy="4965951"/>
+          </a:xfrm>
+          <a:prstGeom prst="rect">
+            <a:avLst/>
+          </a:prstGeom>
+        </p:spPr>
+      </p:pic>
+      <p:pic>
+        <p:nvPicPr>
+          <p:cNvPr id="9" name="Picture 8" descr="A close-up of a ct scan&#10;&#10;Description automatically generated with low confidence">
+            <a:extLst>
+              <a:ext uri="{FF2B5EF4-FFF2-40B4-BE49-F238E27FC236}">
+                <a16:creationId xmlns:a16="http://schemas.microsoft.com/office/drawing/2014/main" id="{A77A6A6A-C73A-2A5A-ADD1-6AF53C4F118C}"/>
+              </a:ext>
+            </a:extLst>
+          </p:cNvPr>
+          <p:cNvPicPr>
+            <a:picLocks noChangeAspect="1"/>
+          </p:cNvPicPr>
+          <p:nvPr/>
+        </p:nvPicPr>
+        <p:blipFill rotWithShape="1">
+          <a:blip r:embed="rId5">
+            <a:extLst>
+              <a:ext uri="{28A0092B-C50C-407E-A947-70E740481C1C}">
+                <a14:useLocalDpi xmlns:a14="http://schemas.microsoft.com/office/drawing/2010/main" val="0"/>
+              </a:ext>
+            </a:extLst>
+          </a:blip>
+          <a:srcRect l="5185" t="22223" r="3056" b="21035"/>
+          <a:stretch/>
+        </p:blipFill>
+        <p:spPr>
+          <a:xfrm>
+            <a:off x="4700625" y="2373896"/>
+            <a:ext cx="7244332" cy="2986508"/>
+          </a:xfrm>
+          <a:prstGeom prst="rect">
+            <a:avLst/>
+          </a:prstGeom>
+        </p:spPr>
+      </p:pic>
+    </p:spTree>
+    <p:extLst>
+      <p:ext uri="{BB962C8B-B14F-4D97-AF65-F5344CB8AC3E}">
+        <p14:creationId xmlns:p14="http://schemas.microsoft.com/office/powerpoint/2010/main" val="1210952469"/>
+      </p:ext>
+    </p:extLst>
+  </p:cSld>
+  <p:clrMapOvr>
+    <a:masterClrMapping/>
+  </p:clrMapOvr>
+</p:sld>
+</file>
+
+<file path=ppt/slides/slide5.xml><?xml version="1.0" encoding="utf-8"?>
+<p:sld xmlns:a="http://schemas.openxmlformats.org/drawingml/2006/main" xmlns:r="http://schemas.openxmlformats.org/officeDocument/2006/relationships" xmlns:p="http://schemas.openxmlformats.org/presentationml/2006/main">
+  <p:cSld>
+    <p:spTree>
+      <p:nvGrpSpPr>
+        <p:cNvPr id="1" name="Shape 195"/>
+        <p:cNvGrpSpPr/>
+        <p:nvPr/>
+      </p:nvGrpSpPr>
+      <p:grpSpPr>
+        <a:xfrm>
+          <a:off x="0" y="0"/>
+          <a:ext cx="0" cy="0"/>
+          <a:chOff x="0" y="0"/>
+          <a:chExt cx="0" cy="0"/>
+        </a:xfrm>
+      </p:grpSpPr>
+      <p:sp>
+        <p:nvSpPr>
           <p:cNvPr id="196" name="Google Shape;196;p3"/>
           <p:cNvSpPr txBox="1"/>
           <p:nvPr/>
@@ -11543,7 +11875,7 @@
 </p:sld>
 </file>
 
-<file path=ppt/slides/slide5.xml><?xml version="1.0" encoding="utf-8"?>
+<file path=ppt/slides/slide6.xml><?xml version="1.0" encoding="utf-8"?>
 <p:sld xmlns:a="http://schemas.openxmlformats.org/drawingml/2006/main" xmlns:r="http://schemas.openxmlformats.org/officeDocument/2006/relationships" xmlns:p="http://schemas.openxmlformats.org/presentationml/2006/main">
   <p:cSld>
     <p:spTree>
@@ -12289,7 +12621,7 @@
 </p:sld>
 </file>
 
-<file path=ppt/slides/slide6.xml><?xml version="1.0" encoding="utf-8"?>
+<file path=ppt/slides/slide7.xml><?xml version="1.0" encoding="utf-8"?>
 <p:sld xmlns:a="http://schemas.openxmlformats.org/drawingml/2006/main" xmlns:r="http://schemas.openxmlformats.org/officeDocument/2006/relationships" xmlns:p="http://schemas.openxmlformats.org/presentationml/2006/main">
   <p:cSld>
     <p:spTree>

</xml_diff>